<commit_message>
fix: fixing of DevOpsPipeline
</commit_message>
<xml_diff>
--- a/starter/DevOpsPipeline.pptx
+++ b/starter/DevOpsPipeline.pptx
@@ -5944,7 +5944,11 @@
             </a:pPr>
             <a:r>
               <a:rPr lang="fr-FR" sz="1000" dirty="0"/>
-              <a:t>Infrastructure as code compliance scanning</a:t>
+              <a:t>Infrastructure as code compliance scanning - </a:t>
+            </a:r>
+            <a:r>
+              <a:rPr lang="fr-FR" sz="1000" dirty="0" err="1"/>
+              <a:t>Regula</a:t>
             </a:r>
             <a:endParaRPr lang="sk-SK" sz="1000" dirty="0"/>
           </a:p>
@@ -6034,7 +6038,7 @@
             </a:r>
             <a:r>
               <a:rPr lang="fr-FR" sz="1000" dirty="0"/>
-              <a:t> code analyses</a:t>
+              <a:t> code analyses – Flake8, Bandit</a:t>
             </a:r>
           </a:p>
         </p:txBody>
@@ -6096,6 +6100,10 @@
             <a:r>
               <a:rPr lang="sk-SK" sz="1000" dirty="0" err="1"/>
               <a:t>scanning</a:t>
+            </a:r>
+            <a:r>
+              <a:rPr lang="en-US" sz="1000" dirty="0"/>
+              <a:t> - Clair</a:t>
             </a:r>
             <a:endParaRPr lang="sk-SK" sz="1000" dirty="0"/>
           </a:p>
@@ -6190,8 +6198,8 @@
         </p:nvSpPr>
         <p:spPr>
           <a:xfrm>
-            <a:off x="6246009" y="3552262"/>
-            <a:ext cx="1666500" cy="597600"/>
+            <a:off x="6246009" y="3552261"/>
+            <a:ext cx="1666500" cy="872901"/>
           </a:xfrm>
           <a:prstGeom prst="rect">
             <a:avLst/>
@@ -6241,6 +6249,45 @@
             <a:r>
               <a:rPr lang="sk-SK" sz="1000" dirty="0" err="1"/>
               <a:t>scanning</a:t>
+            </a:r>
+            <a:r>
+              <a:rPr lang="en-US" sz="1000" dirty="0"/>
+              <a:t> - AWS Inspector</a:t>
+            </a:r>
+          </a:p>
+          <a:p>
+            <a:pPr marL="0" lvl="0" indent="0" algn="ctr" rtl="0">
+              <a:spcBef>
+                <a:spcPts val="0"/>
+              </a:spcBef>
+              <a:spcAft>
+                <a:spcPts val="0"/>
+              </a:spcAft>
+              <a:buNone/>
+            </a:pPr>
+            <a:r>
+              <a:rPr lang="en-US" sz="1000" dirty="0"/>
+              <a:t>AWS </a:t>
+            </a:r>
+            <a:r>
+              <a:rPr lang="en-US" sz="1000" dirty="0" err="1"/>
+              <a:t>SecurityHub</a:t>
+            </a:r>
+            <a:endParaRPr lang="en-US" sz="1000" dirty="0"/>
+          </a:p>
+          <a:p>
+            <a:pPr marL="0" lvl="0" indent="0" algn="ctr" rtl="0">
+              <a:spcBef>
+                <a:spcPts val="0"/>
+              </a:spcBef>
+              <a:spcAft>
+                <a:spcPts val="0"/>
+              </a:spcAft>
+              <a:buNone/>
+            </a:pPr>
+            <a:r>
+              <a:rPr lang="en-US" sz="1000" dirty="0"/>
+              <a:t>AWS Config</a:t>
             </a:r>
             <a:endParaRPr sz="1000" dirty="0"/>
           </a:p>

</xml_diff>